<commit_message>
Live Lecture 15 updates C00/D00
</commit_message>
<xml_diff>
--- a/lectures/lecture-15/Lecture-Live C00/Lecture 15 - Lecture.pptx
+++ b/lectures/lecture-15/Lecture-Live C00/Lecture 15 - Lecture.pptx
@@ -836,7 +836,7 @@
           <a:p>
             <a:fld id="{3A2BF66F-FEB0-48C1-A8B9-A73F54BB1A08}" type="datetimeFigureOut">
               <a:rPr lang="en-US" smtClean="0"/>
-              <a:t>2/9/2021</a:t>
+              <a:t>2/10/2021</a:t>
             </a:fld>
             <a:endParaRPr lang="en-US"/>
           </a:p>
@@ -1036,7 +1036,7 @@
           <a:p>
             <a:fld id="{3A2BF66F-FEB0-48C1-A8B9-A73F54BB1A08}" type="datetimeFigureOut">
               <a:rPr lang="en-US" smtClean="0"/>
-              <a:t>2/9/2021</a:t>
+              <a:t>2/10/2021</a:t>
             </a:fld>
             <a:endParaRPr lang="en-US"/>
           </a:p>
@@ -1246,7 +1246,7 @@
           <a:p>
             <a:fld id="{3A2BF66F-FEB0-48C1-A8B9-A73F54BB1A08}" type="datetimeFigureOut">
               <a:rPr lang="en-US" smtClean="0"/>
-              <a:t>2/9/2021</a:t>
+              <a:t>2/10/2021</a:t>
             </a:fld>
             <a:endParaRPr lang="en-US"/>
           </a:p>
@@ -1446,7 +1446,7 @@
           <a:p>
             <a:fld id="{3A2BF66F-FEB0-48C1-A8B9-A73F54BB1A08}" type="datetimeFigureOut">
               <a:rPr lang="en-US" smtClean="0"/>
-              <a:t>2/9/2021</a:t>
+              <a:t>2/10/2021</a:t>
             </a:fld>
             <a:endParaRPr lang="en-US"/>
           </a:p>
@@ -1723,7 +1723,7 @@
           <a:p>
             <a:fld id="{3A2BF66F-FEB0-48C1-A8B9-A73F54BB1A08}" type="datetimeFigureOut">
               <a:rPr lang="en-US" smtClean="0"/>
-              <a:t>2/9/2021</a:t>
+              <a:t>2/10/2021</a:t>
             </a:fld>
             <a:endParaRPr lang="en-US"/>
           </a:p>
@@ -1990,7 +1990,7 @@
           <a:p>
             <a:fld id="{3A2BF66F-FEB0-48C1-A8B9-A73F54BB1A08}" type="datetimeFigureOut">
               <a:rPr lang="en-US" smtClean="0"/>
-              <a:t>2/9/2021</a:t>
+              <a:t>2/10/2021</a:t>
             </a:fld>
             <a:endParaRPr lang="en-US"/>
           </a:p>
@@ -2404,7 +2404,7 @@
           <a:p>
             <a:fld id="{3A2BF66F-FEB0-48C1-A8B9-A73F54BB1A08}" type="datetimeFigureOut">
               <a:rPr lang="en-US" smtClean="0"/>
-              <a:t>2/9/2021</a:t>
+              <a:t>2/10/2021</a:t>
             </a:fld>
             <a:endParaRPr lang="en-US"/>
           </a:p>
@@ -2547,7 +2547,7 @@
           <a:p>
             <a:fld id="{3A2BF66F-FEB0-48C1-A8B9-A73F54BB1A08}" type="datetimeFigureOut">
               <a:rPr lang="en-US" smtClean="0"/>
-              <a:t>2/9/2021</a:t>
+              <a:t>2/10/2021</a:t>
             </a:fld>
             <a:endParaRPr lang="en-US"/>
           </a:p>
@@ -2662,7 +2662,7 @@
           <a:p>
             <a:fld id="{3A2BF66F-FEB0-48C1-A8B9-A73F54BB1A08}" type="datetimeFigureOut">
               <a:rPr lang="en-US" smtClean="0"/>
-              <a:t>2/9/2021</a:t>
+              <a:t>2/10/2021</a:t>
             </a:fld>
             <a:endParaRPr lang="en-US"/>
           </a:p>
@@ -2974,7 +2974,7 @@
           <a:p>
             <a:fld id="{3A2BF66F-FEB0-48C1-A8B9-A73F54BB1A08}" type="datetimeFigureOut">
               <a:rPr lang="en-US" smtClean="0"/>
-              <a:t>2/9/2021</a:t>
+              <a:t>2/10/2021</a:t>
             </a:fld>
             <a:endParaRPr lang="en-US"/>
           </a:p>
@@ -3264,7 +3264,7 @@
           <a:p>
             <a:fld id="{3A2BF66F-FEB0-48C1-A8B9-A73F54BB1A08}" type="datetimeFigureOut">
               <a:rPr lang="en-US" smtClean="0"/>
-              <a:t>2/9/2021</a:t>
+              <a:t>2/10/2021</a:t>
             </a:fld>
             <a:endParaRPr lang="en-US"/>
           </a:p>
@@ -3507,7 +3507,7 @@
           <a:p>
             <a:fld id="{3A2BF66F-FEB0-48C1-A8B9-A73F54BB1A08}" type="datetimeFigureOut">
               <a:rPr lang="en-US" smtClean="0"/>
-              <a:t>2/9/2021</a:t>
+              <a:t>2/10/2021</a:t>
             </a:fld>
             <a:endParaRPr lang="en-US"/>
           </a:p>
@@ -4119,7 +4119,7 @@
           <a:p>
             <a:r>
               <a:rPr lang="en-US" dirty="0"/>
-              <a:t>Quiz 15 due Monday @ </a:t>
+              <a:t>Quiz 15 due Friday @ </a:t>
             </a:r>
             <a:r>
               <a:rPr lang="en-US" dirty="0" err="1"/>

</xml_diff>